<commit_message>
updated the slides and video for the spring release
</commit_message>
<xml_diff>
--- a/documentation/betaProgressReport/winter_progress_video.pptx
+++ b/documentation/betaProgressReport/winter_progress_video.pptx
@@ -6,10 +6,14 @@
   </p:sldMasterIdLst>
   <p:sldIdLst>
     <p:sldId id="256" r:id="rId2"/>
-    <p:sldId id="257" r:id="rId3"/>
-    <p:sldId id="258" r:id="rId4"/>
-    <p:sldId id="259" r:id="rId5"/>
-    <p:sldId id="260" r:id="rId6"/>
+    <p:sldId id="261" r:id="rId3"/>
+    <p:sldId id="257" r:id="rId4"/>
+    <p:sldId id="264" r:id="rId5"/>
+    <p:sldId id="258" r:id="rId6"/>
+    <p:sldId id="259" r:id="rId7"/>
+    <p:sldId id="262" r:id="rId8"/>
+    <p:sldId id="263" r:id="rId9"/>
+    <p:sldId id="260" r:id="rId10"/>
   </p:sldIdLst>
   <p:sldSz cx="12192000" cy="6858000"/>
   <p:notesSz cx="6858000" cy="9144000"/>
@@ -108,6 +112,11 @@
       </a:defRPr>
     </a:lvl9pPr>
   </p:defaultTextStyle>
+  <p:extLst>
+    <p:ext uri="{EFAFB233-063F-42B5-8137-9DF3F51BA10A}">
+      <p15:sldGuideLst xmlns:p15="http://schemas.microsoft.com/office/powerpoint/2012/main"/>
+    </p:ext>
+  </p:extLst>
 </p:presentation>
 </file>
 
@@ -385,7 +394,7 @@
           <a:p>
             <a:fld id="{5637B142-783F-45E9-9E5F-C3AC18936183}" type="datetimeFigureOut">
               <a:rPr lang="en-US" smtClean="0"/>
-              <a:t>3/14/2016</a:t>
+              <a:t>5/4/2016</a:t>
             </a:fld>
             <a:endParaRPr lang="en-US"/>
           </a:p>
@@ -799,7 +808,7 @@
           <a:p>
             <a:fld id="{5637B142-783F-45E9-9E5F-C3AC18936183}" type="datetimeFigureOut">
               <a:rPr lang="en-US" smtClean="0"/>
-              <a:t>3/14/2016</a:t>
+              <a:t>5/4/2016</a:t>
             </a:fld>
             <a:endParaRPr lang="en-US"/>
           </a:p>
@@ -1135,7 +1144,7 @@
           <a:p>
             <a:fld id="{5637B142-783F-45E9-9E5F-C3AC18936183}" type="datetimeFigureOut">
               <a:rPr lang="en-US" smtClean="0"/>
-              <a:t>3/14/2016</a:t>
+              <a:t>5/4/2016</a:t>
             </a:fld>
             <a:endParaRPr lang="en-US"/>
           </a:p>
@@ -1540,7 +1549,7 @@
           <a:p>
             <a:fld id="{5637B142-783F-45E9-9E5F-C3AC18936183}" type="datetimeFigureOut">
               <a:rPr lang="en-US" smtClean="0"/>
-              <a:t>3/14/2016</a:t>
+              <a:t>5/4/2016</a:t>
             </a:fld>
             <a:endParaRPr lang="en-US"/>
           </a:p>
@@ -2108,7 +2117,7 @@
           <a:p>
             <a:fld id="{5637B142-783F-45E9-9E5F-C3AC18936183}" type="datetimeFigureOut">
               <a:rPr lang="en-US" smtClean="0"/>
-              <a:t>3/14/2016</a:t>
+              <a:t>5/4/2016</a:t>
             </a:fld>
             <a:endParaRPr lang="en-US"/>
           </a:p>
@@ -2789,7 +2798,7 @@
           <a:p>
             <a:fld id="{5637B142-783F-45E9-9E5F-C3AC18936183}" type="datetimeFigureOut">
               <a:rPr lang="en-US" smtClean="0"/>
-              <a:t>3/14/2016</a:t>
+              <a:t>5/4/2016</a:t>
             </a:fld>
             <a:endParaRPr lang="en-US"/>
           </a:p>
@@ -3702,7 +3711,7 @@
           <a:p>
             <a:fld id="{5637B142-783F-45E9-9E5F-C3AC18936183}" type="datetimeFigureOut">
               <a:rPr lang="en-US" smtClean="0"/>
-              <a:t>3/14/2016</a:t>
+              <a:t>5/4/2016</a:t>
             </a:fld>
             <a:endParaRPr lang="en-US"/>
           </a:p>
@@ -4015,7 +4024,7 @@
           <a:p>
             <a:fld id="{5637B142-783F-45E9-9E5F-C3AC18936183}" type="datetimeFigureOut">
               <a:rPr lang="en-US" smtClean="0"/>
-              <a:t>3/14/2016</a:t>
+              <a:t>5/4/2016</a:t>
             </a:fld>
             <a:endParaRPr lang="en-US"/>
           </a:p>
@@ -4279,7 +4288,7 @@
           <a:p>
             <a:fld id="{5637B142-783F-45E9-9E5F-C3AC18936183}" type="datetimeFigureOut">
               <a:rPr lang="en-US" smtClean="0"/>
-              <a:t>3/14/2016</a:t>
+              <a:t>5/4/2016</a:t>
             </a:fld>
             <a:endParaRPr lang="en-US"/>
           </a:p>
@@ -4602,7 +4611,7 @@
           <a:p>
             <a:fld id="{5637B142-783F-45E9-9E5F-C3AC18936183}" type="datetimeFigureOut">
               <a:rPr lang="en-US" smtClean="0"/>
-              <a:t>3/14/2016</a:t>
+              <a:t>5/4/2016</a:t>
             </a:fld>
             <a:endParaRPr lang="en-US"/>
           </a:p>
@@ -4991,7 +5000,7 @@
           <a:p>
             <a:fld id="{5637B142-783F-45E9-9E5F-C3AC18936183}" type="datetimeFigureOut">
               <a:rPr lang="en-US" smtClean="0"/>
-              <a:t>3/14/2016</a:t>
+              <a:t>5/4/2016</a:t>
             </a:fld>
             <a:endParaRPr lang="en-US"/>
           </a:p>
@@ -5367,7 +5376,7 @@
           <a:p>
             <a:fld id="{5637B142-783F-45E9-9E5F-C3AC18936183}" type="datetimeFigureOut">
               <a:rPr lang="en-US" smtClean="0"/>
-              <a:t>3/14/2016</a:t>
+              <a:t>5/4/2016</a:t>
             </a:fld>
             <a:endParaRPr lang="en-US"/>
           </a:p>
@@ -5878,7 +5887,7 @@
           <a:p>
             <a:fld id="{5637B142-783F-45E9-9E5F-C3AC18936183}" type="datetimeFigureOut">
               <a:rPr lang="en-US" smtClean="0"/>
-              <a:t>3/14/2016</a:t>
+              <a:t>5/4/2016</a:t>
             </a:fld>
             <a:endParaRPr lang="en-US"/>
           </a:p>
@@ -6140,7 +6149,7 @@
           <a:p>
             <a:fld id="{5637B142-783F-45E9-9E5F-C3AC18936183}" type="datetimeFigureOut">
               <a:rPr lang="en-US" smtClean="0"/>
-              <a:t>3/14/2016</a:t>
+              <a:t>5/4/2016</a:t>
             </a:fld>
             <a:endParaRPr lang="en-US"/>
           </a:p>
@@ -6303,7 +6312,7 @@
           <a:p>
             <a:fld id="{5637B142-783F-45E9-9E5F-C3AC18936183}" type="datetimeFigureOut">
               <a:rPr lang="en-US" smtClean="0"/>
-              <a:t>3/14/2016</a:t>
+              <a:t>5/4/2016</a:t>
             </a:fld>
             <a:endParaRPr lang="en-US"/>
           </a:p>
@@ -6693,7 +6702,7 @@
           <a:p>
             <a:fld id="{5637B142-783F-45E9-9E5F-C3AC18936183}" type="datetimeFigureOut">
               <a:rPr lang="en-US" smtClean="0"/>
-              <a:t>3/14/2016</a:t>
+              <a:t>5/4/2016</a:t>
             </a:fld>
             <a:endParaRPr lang="en-US"/>
           </a:p>
@@ -7107,7 +7116,7 @@
           <a:p>
             <a:fld id="{5637B142-783F-45E9-9E5F-C3AC18936183}" type="datetimeFigureOut">
               <a:rPr lang="en-US" smtClean="0"/>
-              <a:t>3/14/2016</a:t>
+              <a:t>5/4/2016</a:t>
             </a:fld>
             <a:endParaRPr lang="en-US"/>
           </a:p>
@@ -7351,7 +7360,7 @@
           <a:p>
             <a:fld id="{5637B142-783F-45E9-9E5F-C3AC18936183}" type="datetimeFigureOut">
               <a:rPr lang="en-US" smtClean="0"/>
-              <a:t>3/14/2016</a:t>
+              <a:t>5/4/2016</a:t>
             </a:fld>
             <a:endParaRPr lang="en-US"/>
           </a:p>
@@ -7867,7 +7876,7 @@
           <a:p>
             <a:r>
               <a:rPr lang="en-US" dirty="0" smtClean="0"/>
-              <a:t>Our Purpose</a:t>
+              <a:t>The Problem</a:t>
             </a:r>
             <a:endParaRPr lang="en-US" dirty="0"/>
           </a:p>
@@ -7890,36 +7899,29 @@
           <a:p>
             <a:r>
               <a:rPr lang="en-US" dirty="0" smtClean="0"/>
-              <a:t>New way of visualizing microbial communities</a:t>
+              <a:t>Microbiologists need a way to find differences and similarities between microbial samples</a:t>
+            </a:r>
+          </a:p>
+          <a:p>
+            <a:r>
+              <a:rPr lang="en-US" dirty="0" smtClean="0"/>
+              <a:t>Current methods may not be very optimal</a:t>
             </a:r>
           </a:p>
           <a:p>
             <a:pPr lvl="1"/>
             <a:r>
               <a:rPr lang="en-US" dirty="0" smtClean="0"/>
-              <a:t>Easier to see patterns at a glance</a:t>
-            </a:r>
-          </a:p>
-          <a:p>
-            <a:pPr lvl="1"/>
-            <a:r>
-              <a:rPr lang="en-US" dirty="0" smtClean="0"/>
-              <a:t>Intuitive workflow</a:t>
-            </a:r>
-          </a:p>
-          <a:p>
-            <a:pPr lvl="1"/>
-            <a:r>
-              <a:rPr lang="en-US" dirty="0" smtClean="0"/>
-              <a:t>Potentially allow for new scientific discoveries</a:t>
-            </a:r>
+              <a:t>Humans are not meant to look at dozens of pie charts</a:t>
+            </a:r>
+            <a:endParaRPr lang="en-US" dirty="0"/>
           </a:p>
         </p:txBody>
       </p:sp>
     </p:spTree>
     <p:extLst>
       <p:ext uri="{BB962C8B-B14F-4D97-AF65-F5344CB8AC3E}">
-        <p14:creationId xmlns:p14="http://schemas.microsoft.com/office/powerpoint/2010/main" val="1576639675"/>
+        <p14:creationId xmlns:p14="http://schemas.microsoft.com/office/powerpoint/2010/main" val="956973147"/>
       </p:ext>
     </p:extLst>
   </p:cSld>
@@ -7970,139 +7972,59 @@
           <a:p>
             <a:r>
               <a:rPr lang="en-US" dirty="0" smtClean="0"/>
-              <a:t>Resources</a:t>
+              <a:t>Our Solution</a:t>
             </a:r>
             <a:endParaRPr lang="en-US" dirty="0"/>
           </a:p>
         </p:txBody>
       </p:sp>
-      <p:pic>
-        <p:nvPicPr>
-          <p:cNvPr id="1030" name="Picture 6" descr="http://www.vitalbodies.com/site/uploads/images/graphics/MakeHuman_Full_HD_1920x1080_2.png"/>
-          <p:cNvPicPr>
-            <a:picLocks noChangeAspect="1" noChangeArrowheads="1"/>
-          </p:cNvPicPr>
-          <p:nvPr/>
-        </p:nvPicPr>
-        <p:blipFill>
-          <a:blip r:embed="rId2" cstate="print">
-            <a:extLst>
-              <a:ext uri="{28A0092B-C50C-407E-A947-70E740481C1C}">
-                <a14:useLocalDpi xmlns:a14="http://schemas.microsoft.com/office/drawing/2010/main" val="0"/>
-              </a:ext>
-            </a:extLst>
-          </a:blip>
-          <a:srcRect/>
-          <a:stretch>
-            <a:fillRect/>
-          </a:stretch>
-        </p:blipFill>
-        <p:spPr bwMode="auto">
-          <a:xfrm>
-            <a:off x="848011" y="2541448"/>
-            <a:ext cx="3764446" cy="2117501"/>
-          </a:xfrm>
-          <a:prstGeom prst="rect">
-            <a:avLst/>
-          </a:prstGeom>
-          <a:noFill/>
-          <a:extLst>
-            <a:ext uri="{909E8E84-426E-40DD-AFC4-6F175D3DCCD1}">
-              <a14:hiddenFill xmlns:a14="http://schemas.microsoft.com/office/drawing/2010/main">
-                <a:solidFill>
-                  <a:srgbClr val="FFFFFF"/>
-                </a:solidFill>
-              </a14:hiddenFill>
-            </a:ext>
-          </a:extLst>
-        </p:spPr>
-      </p:pic>
-      <p:pic>
-        <p:nvPicPr>
-          <p:cNvPr id="1032" name="Picture 8" descr="https://s3.amazonaws.com/codementor_content/Python+Martijn+Office+Hour/Python_logo_and_wordmark.png"/>
-          <p:cNvPicPr>
-            <a:picLocks noChangeAspect="1" noChangeArrowheads="1"/>
-          </p:cNvPicPr>
-          <p:nvPr/>
-        </p:nvPicPr>
-        <p:blipFill>
-          <a:blip r:embed="rId3">
-            <a:extLst>
-              <a:ext uri="{28A0092B-C50C-407E-A947-70E740481C1C}">
-                <a14:useLocalDpi xmlns:a14="http://schemas.microsoft.com/office/drawing/2010/main" val="0"/>
-              </a:ext>
-            </a:extLst>
-          </a:blip>
-          <a:srcRect/>
-          <a:stretch>
-            <a:fillRect/>
-          </a:stretch>
-        </p:blipFill>
-        <p:spPr bwMode="auto">
-          <a:xfrm>
-            <a:off x="3294191" y="4995522"/>
-            <a:ext cx="4629150" cy="1371601"/>
-          </a:xfrm>
-          <a:prstGeom prst="rect">
-            <a:avLst/>
-          </a:prstGeom>
-          <a:noFill/>
-          <a:extLst>
-            <a:ext uri="{909E8E84-426E-40DD-AFC4-6F175D3DCCD1}">
-              <a14:hiddenFill xmlns:a14="http://schemas.microsoft.com/office/drawing/2010/main">
-                <a:solidFill>
-                  <a:srgbClr val="FFFFFF"/>
-                </a:solidFill>
-              </a14:hiddenFill>
-            </a:ext>
-          </a:extLst>
-        </p:spPr>
-      </p:pic>
-      <p:pic>
-        <p:nvPicPr>
-          <p:cNvPr id="1034" name="Picture 10" descr="http://www.purplealienplanet.com/sites/default/files/image/Qt_logo.png"/>
-          <p:cNvPicPr>
-            <a:picLocks noChangeAspect="1" noChangeArrowheads="1"/>
-          </p:cNvPicPr>
-          <p:nvPr/>
-        </p:nvPicPr>
-        <p:blipFill>
-          <a:blip r:embed="rId4" cstate="print">
-            <a:extLst>
-              <a:ext uri="{28A0092B-C50C-407E-A947-70E740481C1C}">
-                <a14:useLocalDpi xmlns:a14="http://schemas.microsoft.com/office/drawing/2010/main" val="0"/>
-              </a:ext>
-            </a:extLst>
-          </a:blip>
-          <a:srcRect/>
-          <a:stretch>
-            <a:fillRect/>
-          </a:stretch>
-        </p:blipFill>
-        <p:spPr bwMode="auto">
-          <a:xfrm>
-            <a:off x="5739859" y="2277185"/>
-            <a:ext cx="4554323" cy="2275318"/>
-          </a:xfrm>
-          <a:prstGeom prst="rect">
-            <a:avLst/>
-          </a:prstGeom>
-          <a:noFill/>
-          <a:extLst>
-            <a:ext uri="{909E8E84-426E-40DD-AFC4-6F175D3DCCD1}">
-              <a14:hiddenFill xmlns:a14="http://schemas.microsoft.com/office/drawing/2010/main">
-                <a:solidFill>
-                  <a:srgbClr val="FFFFFF"/>
-                </a:solidFill>
-              </a14:hiddenFill>
-            </a:ext>
-          </a:extLst>
-        </p:spPr>
-      </p:pic>
+      <p:sp>
+        <p:nvSpPr>
+          <p:cNvPr id="3" name="Content Placeholder 2"/>
+          <p:cNvSpPr>
+            <a:spLocks noGrp="1"/>
+          </p:cNvSpPr>
+          <p:nvPr>
+            <p:ph idx="1"/>
+          </p:nvPr>
+        </p:nvSpPr>
+        <p:spPr/>
+        <p:txBody>
+          <a:bodyPr/>
+          <a:lstStyle/>
+          <a:p>
+            <a:r>
+              <a:rPr lang="en-US" dirty="0" smtClean="0"/>
+              <a:t>New way of visualizing microbial communities</a:t>
+            </a:r>
+          </a:p>
+          <a:p>
+            <a:pPr lvl="1"/>
+            <a:r>
+              <a:rPr lang="en-US" dirty="0" smtClean="0"/>
+              <a:t>Easier to see patterns at a glance</a:t>
+            </a:r>
+          </a:p>
+          <a:p>
+            <a:pPr lvl="1"/>
+            <a:r>
+              <a:rPr lang="en-US" dirty="0" smtClean="0"/>
+              <a:t>Intuitive workflow</a:t>
+            </a:r>
+          </a:p>
+          <a:p>
+            <a:pPr lvl="1"/>
+            <a:r>
+              <a:rPr lang="en-US" dirty="0" smtClean="0"/>
+              <a:t>Potentially allow for new scientific discoveries</a:t>
+            </a:r>
+          </a:p>
+        </p:txBody>
+      </p:sp>
     </p:spTree>
     <p:extLst>
       <p:ext uri="{BB962C8B-B14F-4D97-AF65-F5344CB8AC3E}">
-        <p14:creationId xmlns:p14="http://schemas.microsoft.com/office/powerpoint/2010/main" val="1076360564"/>
+        <p14:creationId xmlns:p14="http://schemas.microsoft.com/office/powerpoint/2010/main" val="1576639675"/>
       </p:ext>
     </p:extLst>
   </p:cSld>
@@ -8153,6 +8075,352 @@
           <a:p>
             <a:r>
               <a:rPr lang="en-US" dirty="0" smtClean="0"/>
+              <a:t>Standard Use Case</a:t>
+            </a:r>
+            <a:endParaRPr lang="en-US" dirty="0"/>
+          </a:p>
+        </p:txBody>
+      </p:sp>
+      <p:sp>
+        <p:nvSpPr>
+          <p:cNvPr id="3" name="Content Placeholder 2"/>
+          <p:cNvSpPr>
+            <a:spLocks noGrp="1"/>
+          </p:cNvSpPr>
+          <p:nvPr>
+            <p:ph idx="1"/>
+          </p:nvPr>
+        </p:nvSpPr>
+        <p:spPr/>
+        <p:txBody>
+          <a:bodyPr/>
+          <a:lstStyle/>
+          <a:p>
+            <a:r>
+              <a:rPr lang="en-US" dirty="0" smtClean="0"/>
+              <a:t>Scientist collects microbial samples</a:t>
+            </a:r>
+          </a:p>
+          <a:p>
+            <a:r>
+              <a:rPr lang="en-US" dirty="0" smtClean="0"/>
+              <a:t>Puts data into file along with meta-data file</a:t>
+            </a:r>
+          </a:p>
+          <a:p>
+            <a:r>
+              <a:rPr lang="en-US" dirty="0" smtClean="0"/>
+              <a:t>Runs </a:t>
+            </a:r>
+            <a:r>
+              <a:rPr lang="en-US" dirty="0" err="1" smtClean="0"/>
+              <a:t>FaceView</a:t>
+            </a:r>
+            <a:r>
+              <a:rPr lang="en-US" dirty="0" smtClean="0"/>
+              <a:t> software and loads files in loading interface</a:t>
+            </a:r>
+          </a:p>
+          <a:p>
+            <a:r>
+              <a:rPr lang="en-US" dirty="0" smtClean="0"/>
+              <a:t>Select associations between </a:t>
+            </a:r>
+            <a:r>
+              <a:rPr lang="en-US" dirty="0" err="1" smtClean="0"/>
+              <a:t>speicies</a:t>
+            </a:r>
+            <a:r>
+              <a:rPr lang="en-US" dirty="0" smtClean="0"/>
+              <a:t> and feature</a:t>
+            </a:r>
+          </a:p>
+          <a:p>
+            <a:r>
+              <a:rPr lang="en-US" dirty="0" smtClean="0"/>
+              <a:t>Manage groups in thumbnail interface</a:t>
+            </a:r>
+          </a:p>
+          <a:p>
+            <a:r>
+              <a:rPr lang="en-US" dirty="0" smtClean="0"/>
+              <a:t>Analyzes faces in the analysis interface</a:t>
+            </a:r>
+            <a:endParaRPr lang="en-US" dirty="0"/>
+          </a:p>
+        </p:txBody>
+      </p:sp>
+    </p:spTree>
+    <p:extLst>
+      <p:ext uri="{BB962C8B-B14F-4D97-AF65-F5344CB8AC3E}">
+        <p14:creationId xmlns:p14="http://schemas.microsoft.com/office/powerpoint/2010/main" val="341658632"/>
+      </p:ext>
+    </p:extLst>
+  </p:cSld>
+  <p:clrMapOvr>
+    <a:masterClrMapping/>
+  </p:clrMapOvr>
+</p:sld>
+</file>
+
+<file path=ppt/slides/slide5.xml><?xml version="1.0" encoding="utf-8"?>
+<p:sld xmlns:a="http://schemas.openxmlformats.org/drawingml/2006/main" xmlns:r="http://schemas.openxmlformats.org/officeDocument/2006/relationships" xmlns:p="http://schemas.openxmlformats.org/presentationml/2006/main">
+  <p:cSld>
+    <p:spTree>
+      <p:nvGrpSpPr>
+        <p:cNvPr id="1" name=""/>
+        <p:cNvGrpSpPr/>
+        <p:nvPr/>
+      </p:nvGrpSpPr>
+      <p:grpSpPr>
+        <a:xfrm>
+          <a:off x="0" y="0"/>
+          <a:ext cx="0" cy="0"/>
+          <a:chOff x="0" y="0"/>
+          <a:chExt cx="0" cy="0"/>
+        </a:xfrm>
+      </p:grpSpPr>
+      <p:sp>
+        <p:nvSpPr>
+          <p:cNvPr id="2" name="Title 1"/>
+          <p:cNvSpPr>
+            <a:spLocks noGrp="1"/>
+          </p:cNvSpPr>
+          <p:nvPr>
+            <p:ph type="title"/>
+          </p:nvPr>
+        </p:nvSpPr>
+        <p:spPr/>
+        <p:txBody>
+          <a:bodyPr/>
+          <a:lstStyle/>
+          <a:p>
+            <a:r>
+              <a:rPr lang="en-US" dirty="0" smtClean="0"/>
+              <a:t>Resources</a:t>
+            </a:r>
+            <a:endParaRPr lang="en-US" dirty="0"/>
+          </a:p>
+        </p:txBody>
+      </p:sp>
+      <p:pic>
+        <p:nvPicPr>
+          <p:cNvPr id="1030" name="Picture 6" descr="http://www.vitalbodies.com/site/uploads/images/graphics/MakeHuman_Full_HD_1920x1080_2.png"/>
+          <p:cNvPicPr>
+            <a:picLocks noChangeAspect="1" noChangeArrowheads="1"/>
+          </p:cNvPicPr>
+          <p:nvPr/>
+        </p:nvPicPr>
+        <p:blipFill>
+          <a:blip r:embed="rId2" cstate="print">
+            <a:extLst>
+              <a:ext uri="{28A0092B-C50C-407E-A947-70E740481C1C}">
+                <a14:useLocalDpi xmlns:a14="http://schemas.microsoft.com/office/drawing/2010/main" val="0"/>
+              </a:ext>
+            </a:extLst>
+          </a:blip>
+          <a:srcRect/>
+          <a:stretch>
+            <a:fillRect/>
+          </a:stretch>
+        </p:blipFill>
+        <p:spPr bwMode="auto">
+          <a:xfrm>
+            <a:off x="1103384" y="2435002"/>
+            <a:ext cx="3764446" cy="2117501"/>
+          </a:xfrm>
+          <a:prstGeom prst="rect">
+            <a:avLst/>
+          </a:prstGeom>
+          <a:noFill/>
+          <a:extLst>
+            <a:ext uri="{909E8E84-426E-40DD-AFC4-6F175D3DCCD1}">
+              <a14:hiddenFill xmlns:a14="http://schemas.microsoft.com/office/drawing/2010/main">
+                <a:solidFill>
+                  <a:srgbClr val="FFFFFF"/>
+                </a:solidFill>
+              </a14:hiddenFill>
+            </a:ext>
+          </a:extLst>
+        </p:spPr>
+      </p:pic>
+      <p:pic>
+        <p:nvPicPr>
+          <p:cNvPr id="1034" name="Picture 10" descr="http://www.purplealienplanet.com/sites/default/files/image/Qt_logo.png"/>
+          <p:cNvPicPr>
+            <a:picLocks noChangeAspect="1" noChangeArrowheads="1"/>
+          </p:cNvPicPr>
+          <p:nvPr/>
+        </p:nvPicPr>
+        <p:blipFill>
+          <a:blip r:embed="rId3" cstate="print">
+            <a:extLst>
+              <a:ext uri="{28A0092B-C50C-407E-A947-70E740481C1C}">
+                <a14:useLocalDpi xmlns:a14="http://schemas.microsoft.com/office/drawing/2010/main" val="0"/>
+              </a:ext>
+            </a:extLst>
+          </a:blip>
+          <a:srcRect/>
+          <a:stretch>
+            <a:fillRect/>
+          </a:stretch>
+        </p:blipFill>
+        <p:spPr bwMode="auto">
+          <a:xfrm>
+            <a:off x="5954041" y="2277185"/>
+            <a:ext cx="4554323" cy="2275318"/>
+          </a:xfrm>
+          <a:prstGeom prst="rect">
+            <a:avLst/>
+          </a:prstGeom>
+          <a:noFill/>
+          <a:extLst>
+            <a:ext uri="{909E8E84-426E-40DD-AFC4-6F175D3DCCD1}">
+              <a14:hiddenFill xmlns:a14="http://schemas.microsoft.com/office/drawing/2010/main">
+                <a:solidFill>
+                  <a:srgbClr val="FFFFFF"/>
+                </a:solidFill>
+              </a14:hiddenFill>
+            </a:ext>
+          </a:extLst>
+        </p:spPr>
+      </p:pic>
+      <p:pic>
+        <p:nvPicPr>
+          <p:cNvPr id="1028" name="Picture 4" descr="https://realpython.com/learn/python-first-steps/images/pythonlogo.jpg"/>
+          <p:cNvPicPr>
+            <a:picLocks noChangeAspect="1" noChangeArrowheads="1"/>
+          </p:cNvPicPr>
+          <p:nvPr/>
+        </p:nvPicPr>
+        <p:blipFill>
+          <a:blip r:embed="rId4" cstate="print">
+            <a:extLst>
+              <a:ext uri="{28A0092B-C50C-407E-A947-70E740481C1C}">
+                <a14:useLocalDpi xmlns:a14="http://schemas.microsoft.com/office/drawing/2010/main" val="0"/>
+              </a:ext>
+            </a:extLst>
+          </a:blip>
+          <a:srcRect/>
+          <a:stretch>
+            <a:fillRect/>
+          </a:stretch>
+        </p:blipFill>
+        <p:spPr bwMode="auto">
+          <a:xfrm>
+            <a:off x="1609151" y="4794949"/>
+            <a:ext cx="2752911" cy="1858215"/>
+          </a:xfrm>
+          <a:prstGeom prst="rect">
+            <a:avLst/>
+          </a:prstGeom>
+          <a:noFill/>
+          <a:extLst>
+            <a:ext uri="{909E8E84-426E-40DD-AFC4-6F175D3DCCD1}">
+              <a14:hiddenFill xmlns:a14="http://schemas.microsoft.com/office/drawing/2010/main">
+                <a:solidFill>
+                  <a:srgbClr val="FFFFFF"/>
+                </a:solidFill>
+              </a14:hiddenFill>
+            </a:ext>
+          </a:extLst>
+        </p:spPr>
+      </p:pic>
+      <p:pic>
+        <p:nvPicPr>
+          <p:cNvPr id="3" name="Picture 6" descr="https://upload.wikimedia.org/wikipedia/en/thumb/f/fb/OpenGL_logo_(Nov14).svg/220px-OpenGL_logo_(Nov14).svg.png"/>
+          <p:cNvPicPr>
+            <a:picLocks noChangeAspect="1" noChangeArrowheads="1"/>
+          </p:cNvPicPr>
+          <p:nvPr/>
+        </p:nvPicPr>
+        <p:blipFill>
+          <a:blip r:embed="rId5">
+            <a:extLst>
+              <a:ext uri="{28A0092B-C50C-407E-A947-70E740481C1C}">
+                <a14:useLocalDpi xmlns:a14="http://schemas.microsoft.com/office/drawing/2010/main" val="0"/>
+              </a:ext>
+            </a:extLst>
+          </a:blip>
+          <a:srcRect/>
+          <a:stretch>
+            <a:fillRect/>
+          </a:stretch>
+        </p:blipFill>
+        <p:spPr bwMode="auto">
+          <a:xfrm>
+            <a:off x="6728827" y="4995522"/>
+            <a:ext cx="3243763" cy="1341740"/>
+          </a:xfrm>
+          <a:prstGeom prst="rect">
+            <a:avLst/>
+          </a:prstGeom>
+          <a:noFill/>
+          <a:extLst>
+            <a:ext uri="{909E8E84-426E-40DD-AFC4-6F175D3DCCD1}">
+              <a14:hiddenFill xmlns:a14="http://schemas.microsoft.com/office/drawing/2010/main">
+                <a:solidFill>
+                  <a:srgbClr val="FFFFFF"/>
+                </a:solidFill>
+              </a14:hiddenFill>
+            </a:ext>
+          </a:extLst>
+        </p:spPr>
+      </p:pic>
+    </p:spTree>
+    <p:extLst>
+      <p:ext uri="{BB962C8B-B14F-4D97-AF65-F5344CB8AC3E}">
+        <p14:creationId xmlns:p14="http://schemas.microsoft.com/office/powerpoint/2010/main" val="1076360564"/>
+      </p:ext>
+    </p:extLst>
+  </p:cSld>
+  <p:clrMapOvr>
+    <a:masterClrMapping/>
+  </p:clrMapOvr>
+  <p:timing>
+    <p:tnLst>
+      <p:par>
+        <p:cTn id="1" dur="indefinite" restart="never" nodeType="tmRoot"/>
+      </p:par>
+    </p:tnLst>
+  </p:timing>
+</p:sld>
+</file>
+
+<file path=ppt/slides/slide6.xml><?xml version="1.0" encoding="utf-8"?>
+<p:sld xmlns:a="http://schemas.openxmlformats.org/drawingml/2006/main" xmlns:r="http://schemas.openxmlformats.org/officeDocument/2006/relationships" xmlns:p="http://schemas.openxmlformats.org/presentationml/2006/main">
+  <p:cSld>
+    <p:spTree>
+      <p:nvGrpSpPr>
+        <p:cNvPr id="1" name=""/>
+        <p:cNvGrpSpPr/>
+        <p:nvPr/>
+      </p:nvGrpSpPr>
+      <p:grpSpPr>
+        <a:xfrm>
+          <a:off x="0" y="0"/>
+          <a:ext cx="0" cy="0"/>
+          <a:chOff x="0" y="0"/>
+          <a:chExt cx="0" cy="0"/>
+        </a:xfrm>
+      </p:grpSpPr>
+      <p:sp>
+        <p:nvSpPr>
+          <p:cNvPr id="2" name="Title 1"/>
+          <p:cNvSpPr>
+            <a:spLocks noGrp="1"/>
+          </p:cNvSpPr>
+          <p:nvPr>
+            <p:ph type="title"/>
+          </p:nvPr>
+        </p:nvSpPr>
+        <p:spPr/>
+        <p:txBody>
+          <a:bodyPr/>
+          <a:lstStyle/>
+          <a:p>
+            <a:r>
+              <a:rPr lang="en-US" dirty="0" smtClean="0"/>
               <a:t>File Structure</a:t>
             </a:r>
             <a:endParaRPr lang="en-US" dirty="0"/>
@@ -8349,7 +8617,254 @@
 </p:sld>
 </file>
 
-<file path=ppt/slides/slide5.xml><?xml version="1.0" encoding="utf-8"?>
+<file path=ppt/slides/slide7.xml><?xml version="1.0" encoding="utf-8"?>
+<p:sld xmlns:a="http://schemas.openxmlformats.org/drawingml/2006/main" xmlns:r="http://schemas.openxmlformats.org/officeDocument/2006/relationships" xmlns:p="http://schemas.openxmlformats.org/presentationml/2006/main">
+  <p:cSld>
+    <p:spTree>
+      <p:nvGrpSpPr>
+        <p:cNvPr id="1" name=""/>
+        <p:cNvGrpSpPr/>
+        <p:nvPr/>
+      </p:nvGrpSpPr>
+      <p:grpSpPr>
+        <a:xfrm>
+          <a:off x="0" y="0"/>
+          <a:ext cx="0" cy="0"/>
+          <a:chOff x="0" y="0"/>
+          <a:chExt cx="0" cy="0"/>
+        </a:xfrm>
+      </p:grpSpPr>
+      <p:sp>
+        <p:nvSpPr>
+          <p:cNvPr id="2" name="Title 1"/>
+          <p:cNvSpPr>
+            <a:spLocks noGrp="1"/>
+          </p:cNvSpPr>
+          <p:nvPr>
+            <p:ph type="title"/>
+          </p:nvPr>
+        </p:nvSpPr>
+        <p:spPr/>
+        <p:txBody>
+          <a:bodyPr/>
+          <a:lstStyle/>
+          <a:p>
+            <a:r>
+              <a:rPr lang="en-US" dirty="0" smtClean="0"/>
+              <a:t>Challenges</a:t>
+            </a:r>
+            <a:endParaRPr lang="en-US" dirty="0"/>
+          </a:p>
+        </p:txBody>
+      </p:sp>
+      <p:sp>
+        <p:nvSpPr>
+          <p:cNvPr id="3" name="Content Placeholder 2"/>
+          <p:cNvSpPr>
+            <a:spLocks noGrp="1"/>
+          </p:cNvSpPr>
+          <p:nvPr>
+            <p:ph idx="1"/>
+          </p:nvPr>
+        </p:nvSpPr>
+        <p:spPr/>
+        <p:txBody>
+          <a:bodyPr/>
+          <a:lstStyle/>
+          <a:p>
+            <a:r>
+              <a:rPr lang="en-US" dirty="0" err="1" smtClean="0"/>
+              <a:t>Decypering</a:t>
+            </a:r>
+            <a:r>
+              <a:rPr lang="en-US" dirty="0" smtClean="0"/>
+              <a:t> the </a:t>
+            </a:r>
+            <a:r>
+              <a:rPr lang="en-US" dirty="0" err="1" smtClean="0"/>
+              <a:t>MakeHuman</a:t>
+            </a:r>
+            <a:r>
+              <a:rPr lang="en-US" dirty="0" smtClean="0"/>
+              <a:t> code</a:t>
+            </a:r>
+          </a:p>
+          <a:p>
+            <a:r>
+              <a:rPr lang="en-US" dirty="0" smtClean="0"/>
+              <a:t>Using </a:t>
+            </a:r>
+            <a:r>
+              <a:rPr lang="en-US" dirty="0" err="1" smtClean="0"/>
+              <a:t>OpenGl</a:t>
+            </a:r>
+            <a:r>
+              <a:rPr lang="en-US" dirty="0" smtClean="0"/>
+              <a:t> in Python</a:t>
+            </a:r>
+          </a:p>
+          <a:p>
+            <a:r>
+              <a:rPr lang="en-US" dirty="0" smtClean="0"/>
+              <a:t>Problems </a:t>
+            </a:r>
+            <a:r>
+              <a:rPr lang="en-US" dirty="0" err="1" smtClean="0"/>
+              <a:t>wih</a:t>
+            </a:r>
+            <a:r>
+              <a:rPr lang="en-US" dirty="0" smtClean="0"/>
+              <a:t> </a:t>
+            </a:r>
+            <a:r>
+              <a:rPr lang="en-US" dirty="0" err="1" smtClean="0"/>
+              <a:t>PyQt</a:t>
+            </a:r>
+            <a:endParaRPr lang="en-US" dirty="0"/>
+          </a:p>
+        </p:txBody>
+      </p:sp>
+    </p:spTree>
+    <p:extLst>
+      <p:ext uri="{BB962C8B-B14F-4D97-AF65-F5344CB8AC3E}">
+        <p14:creationId xmlns:p14="http://schemas.microsoft.com/office/powerpoint/2010/main" val="2542533845"/>
+      </p:ext>
+    </p:extLst>
+  </p:cSld>
+  <p:clrMapOvr>
+    <a:masterClrMapping/>
+  </p:clrMapOvr>
+  <p:timing>
+    <p:tnLst>
+      <p:par>
+        <p:cTn id="1" dur="indefinite" restart="never" nodeType="tmRoot"/>
+      </p:par>
+    </p:tnLst>
+  </p:timing>
+</p:sld>
+</file>
+
+<file path=ppt/slides/slide8.xml><?xml version="1.0" encoding="utf-8"?>
+<p:sld xmlns:a="http://schemas.openxmlformats.org/drawingml/2006/main" xmlns:r="http://schemas.openxmlformats.org/officeDocument/2006/relationships" xmlns:p="http://schemas.openxmlformats.org/presentationml/2006/main">
+  <p:cSld>
+    <p:spTree>
+      <p:nvGrpSpPr>
+        <p:cNvPr id="1" name=""/>
+        <p:cNvGrpSpPr/>
+        <p:nvPr/>
+      </p:nvGrpSpPr>
+      <p:grpSpPr>
+        <a:xfrm>
+          <a:off x="0" y="0"/>
+          <a:ext cx="0" cy="0"/>
+          <a:chOff x="0" y="0"/>
+          <a:chExt cx="0" cy="0"/>
+        </a:xfrm>
+      </p:grpSpPr>
+      <p:sp>
+        <p:nvSpPr>
+          <p:cNvPr id="2" name="Title 1"/>
+          <p:cNvSpPr>
+            <a:spLocks noGrp="1"/>
+          </p:cNvSpPr>
+          <p:nvPr>
+            <p:ph type="title"/>
+          </p:nvPr>
+        </p:nvSpPr>
+        <p:spPr/>
+        <p:txBody>
+          <a:bodyPr/>
+          <a:lstStyle/>
+          <a:p>
+            <a:r>
+              <a:rPr lang="en-US" dirty="0" smtClean="0"/>
+              <a:t>User Study</a:t>
+            </a:r>
+            <a:endParaRPr lang="en-US" dirty="0"/>
+          </a:p>
+        </p:txBody>
+      </p:sp>
+      <p:sp>
+        <p:nvSpPr>
+          <p:cNvPr id="3" name="Content Placeholder 2"/>
+          <p:cNvSpPr>
+            <a:spLocks noGrp="1"/>
+          </p:cNvSpPr>
+          <p:nvPr>
+            <p:ph idx="1"/>
+          </p:nvPr>
+        </p:nvSpPr>
+        <p:spPr/>
+        <p:txBody>
+          <a:bodyPr/>
+          <a:lstStyle/>
+          <a:p>
+            <a:r>
+              <a:rPr lang="en-US" dirty="0" smtClean="0"/>
+              <a:t>5 OSU students of different backgrounds</a:t>
+            </a:r>
+          </a:p>
+          <a:p>
+            <a:r>
+              <a:rPr lang="en-US" dirty="0" smtClean="0"/>
+              <a:t>Implemented suggestions for change</a:t>
+            </a:r>
+          </a:p>
+          <a:p>
+            <a:pPr lvl="1"/>
+            <a:r>
+              <a:rPr lang="en-US" dirty="0" smtClean="0"/>
+              <a:t>Fix a bug that prevented all selected models to be analyzed</a:t>
+            </a:r>
+          </a:p>
+          <a:p>
+            <a:pPr lvl="1"/>
+            <a:r>
+              <a:rPr lang="en-US" dirty="0" smtClean="0"/>
+              <a:t>Change highlighting colors in the thumbnail interface</a:t>
+            </a:r>
+          </a:p>
+          <a:p>
+            <a:pPr lvl="1"/>
+            <a:r>
+              <a:rPr lang="en-US" dirty="0" smtClean="0"/>
+              <a:t>Add ability to go back to previous views</a:t>
+            </a:r>
+          </a:p>
+          <a:p>
+            <a:pPr lvl="1"/>
+            <a:r>
+              <a:rPr lang="en-US" dirty="0" smtClean="0"/>
+              <a:t>Change names for model parameters</a:t>
+            </a:r>
+          </a:p>
+          <a:p>
+            <a:pPr lvl="1"/>
+            <a:endParaRPr lang="en-US" dirty="0" smtClean="0"/>
+          </a:p>
+        </p:txBody>
+      </p:sp>
+    </p:spTree>
+    <p:extLst>
+      <p:ext uri="{BB962C8B-B14F-4D97-AF65-F5344CB8AC3E}">
+        <p14:creationId xmlns:p14="http://schemas.microsoft.com/office/powerpoint/2010/main" val="313971784"/>
+      </p:ext>
+    </p:extLst>
+  </p:cSld>
+  <p:clrMapOvr>
+    <a:masterClrMapping/>
+  </p:clrMapOvr>
+  <p:timing>
+    <p:tnLst>
+      <p:par>
+        <p:cTn id="1" dur="indefinite" restart="never" nodeType="tmRoot"/>
+      </p:par>
+    </p:tnLst>
+  </p:timing>
+</p:sld>
+</file>
+
+<file path=ppt/slides/slide9.xml><?xml version="1.0" encoding="utf-8"?>
 <p:sld xmlns:a="http://schemas.openxmlformats.org/drawingml/2006/main" xmlns:r="http://schemas.openxmlformats.org/officeDocument/2006/relationships" xmlns:p="http://schemas.openxmlformats.org/presentationml/2006/main">
   <p:cSld>
     <p:spTree>

</xml_diff>